<commit_message>
add pseudo code for percept algo
</commit_message>
<xml_diff>
--- a/Presentations/ML - Perceptron.pptx
+++ b/Presentations/ML - Perceptron.pptx
@@ -5,7 +5,7 @@
     <p:sldMasterId id="2147483648" r:id="rId1"/>
   </p:sldMasterIdLst>
   <p:notesMasterIdLst>
-    <p:notesMasterId r:id="rId9"/>
+    <p:notesMasterId r:id="rId10"/>
   </p:notesMasterIdLst>
   <p:sldIdLst>
     <p:sldId id="256" r:id="rId2"/>
@@ -14,7 +14,8 @@
     <p:sldId id="283" r:id="rId5"/>
     <p:sldId id="284" r:id="rId6"/>
     <p:sldId id="285" r:id="rId7"/>
-    <p:sldId id="287" r:id="rId8"/>
+    <p:sldId id="288" r:id="rId8"/>
+    <p:sldId id="287" r:id="rId9"/>
   </p:sldIdLst>
   <p:sldSz cx="9144000" cy="6858000" type="screen4x3"/>
   <p:notesSz cx="6858000" cy="9144000"/>
@@ -9964,7 +9965,7 @@
         <p:spPr>
           <a:xfrm>
             <a:off x="7649704" y="3402480"/>
-            <a:ext cx="546945" cy="276999"/>
+            <a:ext cx="593432" cy="276999"/>
           </a:xfrm>
           <a:prstGeom prst="rect">
             <a:avLst/>
@@ -9979,7 +9980,7 @@
           <a:p>
             <a:r>
               <a:rPr lang="en-US" sz="1200" dirty="0" smtClean="0"/>
-              <a:t>0 or 1</a:t>
+              <a:t>-1 or 1</a:t>
             </a:r>
             <a:endParaRPr lang="en-US" sz="1200" dirty="0"/>
           </a:p>
@@ -10253,7 +10254,7 @@
         <p:spPr>
           <a:xfrm>
             <a:off x="7235593" y="3934604"/>
-            <a:ext cx="1264642" cy="461665"/>
+            <a:ext cx="1278042" cy="461665"/>
           </a:xfrm>
           <a:prstGeom prst="rect">
             <a:avLst/>
@@ -10282,7 +10283,7 @@
                   <a:srgbClr val="00B050"/>
                 </a:solidFill>
               </a:rPr>
-              <a:t>to either a 0 or 1</a:t>
+              <a:t>to either a -1 or 1</a:t>
             </a:r>
             <a:endParaRPr lang="en-US" sz="1200" dirty="0">
               <a:solidFill>
@@ -11600,7 +11601,7 @@
         <p:spPr>
           <a:xfrm>
             <a:off x="5120101" y="4352130"/>
-            <a:ext cx="1697901" cy="646331"/>
+            <a:ext cx="1750800" cy="646331"/>
           </a:xfrm>
           <a:prstGeom prst="rect">
             <a:avLst/>
@@ -11621,7 +11622,7 @@
                   </a:schemeClr>
                 </a:solidFill>
               </a:rPr>
-              <a:t>1 if w * x + b &gt; 0</a:t>
+              <a:t>1  if w * x + b &gt; 0</a:t>
             </a:r>
           </a:p>
           <a:p>
@@ -11633,7 +11634,7 @@
                   </a:schemeClr>
                 </a:solidFill>
               </a:rPr>
-              <a:t>0 otherwise</a:t>
+              <a:t>-1 otherwise</a:t>
             </a:r>
             <a:endParaRPr lang="en-US" dirty="0">
               <a:solidFill>
@@ -12091,6 +12092,1717 @@
 </file>
 
 <file path=ppt/slides/slide7.xml><?xml version="1.0" encoding="utf-8"?>
+<p:sld xmlns:a="http://schemas.openxmlformats.org/drawingml/2006/main" xmlns:r="http://schemas.openxmlformats.org/officeDocument/2006/relationships" xmlns:p="http://schemas.openxmlformats.org/presentationml/2006/main">
+  <p:cSld>
+    <p:spTree>
+      <p:nvGrpSpPr>
+        <p:cNvPr id="1" name=""/>
+        <p:cNvGrpSpPr/>
+        <p:nvPr/>
+      </p:nvGrpSpPr>
+      <p:grpSpPr>
+        <a:xfrm>
+          <a:off x="0" y="0"/>
+          <a:ext cx="0" cy="0"/>
+          <a:chOff x="0" y="0"/>
+          <a:chExt cx="0" cy="0"/>
+        </a:xfrm>
+      </p:grpSpPr>
+      <p:sp>
+        <p:nvSpPr>
+          <p:cNvPr id="2" name="Title 1"/>
+          <p:cNvSpPr>
+            <a:spLocks noGrp="1"/>
+          </p:cNvSpPr>
+          <p:nvPr>
+            <p:ph type="title"/>
+          </p:nvPr>
+        </p:nvSpPr>
+        <p:spPr>
+          <a:xfrm>
+            <a:off x="457200" y="274638"/>
+            <a:ext cx="8305800" cy="792162"/>
+          </a:xfrm>
+        </p:spPr>
+        <p:txBody>
+          <a:bodyPr>
+            <a:normAutofit/>
+          </a:bodyPr>
+          <a:lstStyle/>
+          <a:p>
+            <a:pPr algn="l"/>
+            <a:r>
+              <a:rPr lang="en-US" dirty="0" smtClean="0">
+                <a:solidFill>
+                  <a:schemeClr val="accent1">
+                    <a:lumMod val="75000"/>
+                  </a:schemeClr>
+                </a:solidFill>
+              </a:rPr>
+              <a:t>Algorithm</a:t>
+            </a:r>
+            <a:endParaRPr lang="en-US" dirty="0">
+              <a:solidFill>
+                <a:schemeClr val="accent1">
+                  <a:lumMod val="75000"/>
+                </a:schemeClr>
+              </a:solidFill>
+            </a:endParaRPr>
+          </a:p>
+        </p:txBody>
+      </p:sp>
+      <p:cxnSp>
+        <p:nvCxnSpPr>
+          <p:cNvPr id="5" name="Straight Connector 4"/>
+          <p:cNvCxnSpPr/>
+          <p:nvPr/>
+        </p:nvCxnSpPr>
+        <p:spPr>
+          <a:xfrm>
+            <a:off x="0" y="990600"/>
+            <a:ext cx="9144000" cy="0"/>
+          </a:xfrm>
+          <a:prstGeom prst="line">
+            <a:avLst/>
+          </a:prstGeom>
+          <a:ln w="19050"/>
+        </p:spPr>
+        <p:style>
+          <a:lnRef idx="1">
+            <a:schemeClr val="accent1"/>
+          </a:lnRef>
+          <a:fillRef idx="0">
+            <a:schemeClr val="accent1"/>
+          </a:fillRef>
+          <a:effectRef idx="0">
+            <a:schemeClr val="accent1"/>
+          </a:effectRef>
+          <a:fontRef idx="minor">
+            <a:schemeClr val="tx1"/>
+          </a:fontRef>
+        </p:style>
+      </p:cxnSp>
+      <p:sp>
+        <p:nvSpPr>
+          <p:cNvPr id="6" name="Oval 5"/>
+          <p:cNvSpPr/>
+          <p:nvPr/>
+        </p:nvSpPr>
+        <p:spPr>
+          <a:xfrm>
+            <a:off x="3453375" y="1609317"/>
+            <a:ext cx="533400" cy="516523"/>
+          </a:xfrm>
+          <a:prstGeom prst="ellipse">
+            <a:avLst/>
+          </a:prstGeom>
+          <a:solidFill>
+            <a:schemeClr val="bg1"/>
+          </a:solidFill>
+          <a:ln>
+            <a:solidFill>
+              <a:schemeClr val="bg1">
+                <a:lumMod val="50000"/>
+              </a:schemeClr>
+            </a:solidFill>
+          </a:ln>
+        </p:spPr>
+        <p:style>
+          <a:lnRef idx="2">
+            <a:schemeClr val="accent1">
+              <a:shade val="50000"/>
+            </a:schemeClr>
+          </a:lnRef>
+          <a:fillRef idx="1">
+            <a:schemeClr val="accent1"/>
+          </a:fillRef>
+          <a:effectRef idx="0">
+            <a:schemeClr val="accent1"/>
+          </a:effectRef>
+          <a:fontRef idx="minor">
+            <a:schemeClr val="lt1"/>
+          </a:fontRef>
+        </p:style>
+        <p:txBody>
+          <a:bodyPr rtlCol="0" anchor="ctr"/>
+          <a:lstStyle/>
+          <a:p>
+            <a:pPr algn="ctr"/>
+            <a:r>
+              <a:rPr lang="en-US" sz="1600" dirty="0" smtClean="0">
+                <a:solidFill>
+                  <a:schemeClr val="tx1"/>
+                </a:solidFill>
+              </a:rPr>
+              <a:t>X</a:t>
+            </a:r>
+            <a:r>
+              <a:rPr lang="en-US" sz="1600" baseline="-25000" dirty="0" smtClean="0">
+                <a:solidFill>
+                  <a:schemeClr val="tx1"/>
+                </a:solidFill>
+              </a:rPr>
+              <a:t>1</a:t>
+            </a:r>
+            <a:endParaRPr lang="en-US" sz="1600" baseline="-25000" dirty="0">
+              <a:solidFill>
+                <a:schemeClr val="tx1"/>
+              </a:solidFill>
+            </a:endParaRPr>
+          </a:p>
+        </p:txBody>
+      </p:sp>
+      <p:sp>
+        <p:nvSpPr>
+          <p:cNvPr id="69" name="Oval 68"/>
+          <p:cNvSpPr/>
+          <p:nvPr/>
+        </p:nvSpPr>
+        <p:spPr>
+          <a:xfrm>
+            <a:off x="3481950" y="2421115"/>
+            <a:ext cx="533400" cy="516523"/>
+          </a:xfrm>
+          <a:prstGeom prst="ellipse">
+            <a:avLst/>
+          </a:prstGeom>
+          <a:solidFill>
+            <a:schemeClr val="bg1"/>
+          </a:solidFill>
+          <a:ln>
+            <a:solidFill>
+              <a:schemeClr val="bg1">
+                <a:lumMod val="50000"/>
+              </a:schemeClr>
+            </a:solidFill>
+          </a:ln>
+        </p:spPr>
+        <p:style>
+          <a:lnRef idx="2">
+            <a:schemeClr val="accent1">
+              <a:shade val="50000"/>
+            </a:schemeClr>
+          </a:lnRef>
+          <a:fillRef idx="1">
+            <a:schemeClr val="accent1"/>
+          </a:fillRef>
+          <a:effectRef idx="0">
+            <a:schemeClr val="accent1"/>
+          </a:effectRef>
+          <a:fontRef idx="minor">
+            <a:schemeClr val="lt1"/>
+          </a:fontRef>
+        </p:style>
+        <p:txBody>
+          <a:bodyPr rtlCol="0" anchor="ctr"/>
+          <a:lstStyle/>
+          <a:p>
+            <a:pPr algn="ctr"/>
+            <a:r>
+              <a:rPr lang="en-US" sz="1600" dirty="0" smtClean="0">
+                <a:solidFill>
+                  <a:schemeClr val="tx1"/>
+                </a:solidFill>
+              </a:rPr>
+              <a:t>X</a:t>
+            </a:r>
+            <a:r>
+              <a:rPr lang="en-US" sz="1600" baseline="-25000" dirty="0" smtClean="0">
+                <a:solidFill>
+                  <a:schemeClr val="tx1"/>
+                </a:solidFill>
+              </a:rPr>
+              <a:t>2</a:t>
+            </a:r>
+            <a:endParaRPr lang="en-US" sz="1600" baseline="-25000" dirty="0">
+              <a:solidFill>
+                <a:schemeClr val="tx1"/>
+              </a:solidFill>
+            </a:endParaRPr>
+          </a:p>
+        </p:txBody>
+      </p:sp>
+      <p:sp>
+        <p:nvSpPr>
+          <p:cNvPr id="70" name="Oval 69"/>
+          <p:cNvSpPr/>
+          <p:nvPr/>
+        </p:nvSpPr>
+        <p:spPr>
+          <a:xfrm>
+            <a:off x="3453375" y="3259315"/>
+            <a:ext cx="533400" cy="516523"/>
+          </a:xfrm>
+          <a:prstGeom prst="ellipse">
+            <a:avLst/>
+          </a:prstGeom>
+          <a:solidFill>
+            <a:schemeClr val="bg1"/>
+          </a:solidFill>
+          <a:ln>
+            <a:solidFill>
+              <a:schemeClr val="bg1">
+                <a:lumMod val="50000"/>
+              </a:schemeClr>
+            </a:solidFill>
+          </a:ln>
+        </p:spPr>
+        <p:style>
+          <a:lnRef idx="2">
+            <a:schemeClr val="accent1">
+              <a:shade val="50000"/>
+            </a:schemeClr>
+          </a:lnRef>
+          <a:fillRef idx="1">
+            <a:schemeClr val="accent1"/>
+          </a:fillRef>
+          <a:effectRef idx="0">
+            <a:schemeClr val="accent1"/>
+          </a:effectRef>
+          <a:fontRef idx="minor">
+            <a:schemeClr val="lt1"/>
+          </a:fontRef>
+        </p:style>
+        <p:txBody>
+          <a:bodyPr rtlCol="0" anchor="ctr"/>
+          <a:lstStyle/>
+          <a:p>
+            <a:pPr algn="ctr"/>
+            <a:r>
+              <a:rPr lang="en-US" sz="1600" dirty="0" smtClean="0">
+                <a:solidFill>
+                  <a:schemeClr val="tx1"/>
+                </a:solidFill>
+              </a:rPr>
+              <a:t>X</a:t>
+            </a:r>
+            <a:r>
+              <a:rPr lang="en-US" sz="1600" baseline="-25000" dirty="0">
+                <a:solidFill>
+                  <a:schemeClr val="tx1"/>
+                </a:solidFill>
+              </a:rPr>
+              <a:t>3</a:t>
+            </a:r>
+          </a:p>
+        </p:txBody>
+      </p:sp>
+      <p:sp>
+        <p:nvSpPr>
+          <p:cNvPr id="7" name="TextBox 6"/>
+          <p:cNvSpPr txBox="1"/>
+          <p:nvPr/>
+        </p:nvSpPr>
+        <p:spPr>
+          <a:xfrm>
+            <a:off x="3099200" y="1326052"/>
+            <a:ext cx="1241750" cy="276999"/>
+          </a:xfrm>
+          <a:prstGeom prst="rect">
+            <a:avLst/>
+          </a:prstGeom>
+          <a:noFill/>
+        </p:spPr>
+        <p:txBody>
+          <a:bodyPr wrap="none" rtlCol="0">
+            <a:spAutoFit/>
+          </a:bodyPr>
+          <a:lstStyle/>
+          <a:p>
+            <a:r>
+              <a:rPr lang="en-US" sz="1200" dirty="0" smtClean="0"/>
+              <a:t>Inputs (Features)</a:t>
+            </a:r>
+            <a:endParaRPr lang="en-US" sz="1200" dirty="0"/>
+          </a:p>
+        </p:txBody>
+      </p:sp>
+      <p:sp>
+        <p:nvSpPr>
+          <p:cNvPr id="72" name="Oval 71"/>
+          <p:cNvSpPr/>
+          <p:nvPr/>
+        </p:nvSpPr>
+        <p:spPr>
+          <a:xfrm>
+            <a:off x="4863075" y="2421114"/>
+            <a:ext cx="533400" cy="516523"/>
+          </a:xfrm>
+          <a:prstGeom prst="ellipse">
+            <a:avLst/>
+          </a:prstGeom>
+          <a:solidFill>
+            <a:schemeClr val="bg1"/>
+          </a:solidFill>
+          <a:ln>
+            <a:solidFill>
+              <a:schemeClr val="bg1">
+                <a:lumMod val="50000"/>
+              </a:schemeClr>
+            </a:solidFill>
+          </a:ln>
+        </p:spPr>
+        <p:style>
+          <a:lnRef idx="2">
+            <a:schemeClr val="accent1">
+              <a:shade val="50000"/>
+            </a:schemeClr>
+          </a:lnRef>
+          <a:fillRef idx="1">
+            <a:schemeClr val="accent1"/>
+          </a:fillRef>
+          <a:effectRef idx="0">
+            <a:schemeClr val="accent1"/>
+          </a:effectRef>
+          <a:fontRef idx="minor">
+            <a:schemeClr val="lt1"/>
+          </a:fontRef>
+        </p:style>
+        <p:txBody>
+          <a:bodyPr rtlCol="0" anchor="ctr"/>
+          <a:lstStyle/>
+          <a:p>
+            <a:pPr algn="ctr"/>
+            <a:r>
+              <a:rPr lang="en-US" sz="1600" dirty="0" smtClean="0">
+                <a:solidFill>
+                  <a:schemeClr val="tx1"/>
+                </a:solidFill>
+              </a:rPr>
+              <a:t>∑</a:t>
+            </a:r>
+            <a:endParaRPr lang="en-US" sz="1600" dirty="0">
+              <a:solidFill>
+                <a:schemeClr val="tx1"/>
+              </a:solidFill>
+            </a:endParaRPr>
+          </a:p>
+        </p:txBody>
+      </p:sp>
+      <p:cxnSp>
+        <p:nvCxnSpPr>
+          <p:cNvPr id="13" name="Straight Arrow Connector 12"/>
+          <p:cNvCxnSpPr>
+            <a:stCxn id="6" idx="5"/>
+          </p:cNvCxnSpPr>
+          <p:nvPr/>
+        </p:nvCxnSpPr>
+        <p:spPr>
+          <a:xfrm>
+            <a:off x="3908660" y="2050197"/>
+            <a:ext cx="954415" cy="473520"/>
+          </a:xfrm>
+          <a:prstGeom prst="straightConnector1">
+            <a:avLst/>
+          </a:prstGeom>
+          <a:ln>
+            <a:solidFill>
+              <a:schemeClr val="tx1"/>
+            </a:solidFill>
+            <a:tailEnd type="arrow"/>
+          </a:ln>
+        </p:spPr>
+        <p:style>
+          <a:lnRef idx="1">
+            <a:schemeClr val="accent1"/>
+          </a:lnRef>
+          <a:fillRef idx="0">
+            <a:schemeClr val="accent1"/>
+          </a:fillRef>
+          <a:effectRef idx="0">
+            <a:schemeClr val="accent1"/>
+          </a:effectRef>
+          <a:fontRef idx="minor">
+            <a:schemeClr val="tx1"/>
+          </a:fontRef>
+        </p:style>
+      </p:cxnSp>
+      <p:cxnSp>
+        <p:nvCxnSpPr>
+          <p:cNvPr id="75" name="Straight Arrow Connector 74"/>
+          <p:cNvCxnSpPr/>
+          <p:nvPr/>
+        </p:nvCxnSpPr>
+        <p:spPr>
+          <a:xfrm>
+            <a:off x="4033895" y="2679374"/>
+            <a:ext cx="771072" cy="1"/>
+          </a:xfrm>
+          <a:prstGeom prst="straightConnector1">
+            <a:avLst/>
+          </a:prstGeom>
+          <a:ln>
+            <a:solidFill>
+              <a:schemeClr val="tx1"/>
+            </a:solidFill>
+            <a:tailEnd type="arrow"/>
+          </a:ln>
+        </p:spPr>
+        <p:style>
+          <a:lnRef idx="1">
+            <a:schemeClr val="accent1"/>
+          </a:lnRef>
+          <a:fillRef idx="0">
+            <a:schemeClr val="accent1"/>
+          </a:fillRef>
+          <a:effectRef idx="0">
+            <a:schemeClr val="accent1"/>
+          </a:effectRef>
+          <a:fontRef idx="minor">
+            <a:schemeClr val="tx1"/>
+          </a:fontRef>
+        </p:style>
+      </p:cxnSp>
+      <p:cxnSp>
+        <p:nvCxnSpPr>
+          <p:cNvPr id="82" name="Straight Arrow Connector 81"/>
+          <p:cNvCxnSpPr/>
+          <p:nvPr/>
+        </p:nvCxnSpPr>
+        <p:spPr>
+          <a:xfrm flipV="1">
+            <a:off x="4000331" y="2828517"/>
+            <a:ext cx="862744" cy="710561"/>
+          </a:xfrm>
+          <a:prstGeom prst="straightConnector1">
+            <a:avLst/>
+          </a:prstGeom>
+          <a:ln>
+            <a:solidFill>
+              <a:schemeClr val="tx1"/>
+            </a:solidFill>
+            <a:tailEnd type="arrow"/>
+          </a:ln>
+        </p:spPr>
+        <p:style>
+          <a:lnRef idx="1">
+            <a:schemeClr val="accent1"/>
+          </a:lnRef>
+          <a:fillRef idx="0">
+            <a:schemeClr val="accent1"/>
+          </a:fillRef>
+          <a:effectRef idx="0">
+            <a:schemeClr val="accent1"/>
+          </a:effectRef>
+          <a:fontRef idx="minor">
+            <a:schemeClr val="tx1"/>
+          </a:fontRef>
+        </p:style>
+      </p:cxnSp>
+      <p:sp>
+        <p:nvSpPr>
+          <p:cNvPr id="97" name="TextBox 96"/>
+          <p:cNvSpPr txBox="1"/>
+          <p:nvPr/>
+        </p:nvSpPr>
+        <p:spPr>
+          <a:xfrm>
+            <a:off x="4844025" y="2096495"/>
+            <a:ext cx="630301" cy="276999"/>
+          </a:xfrm>
+          <a:prstGeom prst="rect">
+            <a:avLst/>
+          </a:prstGeom>
+          <a:noFill/>
+        </p:spPr>
+        <p:txBody>
+          <a:bodyPr wrap="none" rtlCol="0">
+            <a:spAutoFit/>
+          </a:bodyPr>
+          <a:lstStyle/>
+          <a:p>
+            <a:r>
+              <a:rPr lang="en-US" sz="1200" dirty="0" smtClean="0"/>
+              <a:t>Output</a:t>
+            </a:r>
+            <a:endParaRPr lang="en-US" sz="1200" dirty="0"/>
+          </a:p>
+        </p:txBody>
+      </p:sp>
+      <p:sp>
+        <p:nvSpPr>
+          <p:cNvPr id="110" name="TextBox 109"/>
+          <p:cNvSpPr txBox="1"/>
+          <p:nvPr/>
+        </p:nvSpPr>
+        <p:spPr>
+          <a:xfrm>
+            <a:off x="4078535" y="1957995"/>
+            <a:ext cx="372218" cy="276999"/>
+          </a:xfrm>
+          <a:prstGeom prst="rect">
+            <a:avLst/>
+          </a:prstGeom>
+          <a:noFill/>
+        </p:spPr>
+        <p:txBody>
+          <a:bodyPr wrap="none" rtlCol="0">
+            <a:spAutoFit/>
+          </a:bodyPr>
+          <a:lstStyle/>
+          <a:p>
+            <a:r>
+              <a:rPr lang="en-US" sz="1200" dirty="0" smtClean="0"/>
+              <a:t>W</a:t>
+            </a:r>
+            <a:r>
+              <a:rPr lang="en-US" sz="1200" baseline="-25000" dirty="0" smtClean="0"/>
+              <a:t>1</a:t>
+            </a:r>
+            <a:endParaRPr lang="en-US" sz="1200" baseline="-25000" dirty="0"/>
+          </a:p>
+        </p:txBody>
+      </p:sp>
+      <p:sp>
+        <p:nvSpPr>
+          <p:cNvPr id="118" name="TextBox 117"/>
+          <p:cNvSpPr txBox="1"/>
+          <p:nvPr/>
+        </p:nvSpPr>
+        <p:spPr>
+          <a:xfrm>
+            <a:off x="4070760" y="2437218"/>
+            <a:ext cx="372218" cy="276999"/>
+          </a:xfrm>
+          <a:prstGeom prst="rect">
+            <a:avLst/>
+          </a:prstGeom>
+          <a:noFill/>
+        </p:spPr>
+        <p:txBody>
+          <a:bodyPr wrap="none" rtlCol="0">
+            <a:spAutoFit/>
+          </a:bodyPr>
+          <a:lstStyle/>
+          <a:p>
+            <a:r>
+              <a:rPr lang="en-US" sz="1200" dirty="0" smtClean="0"/>
+              <a:t>W</a:t>
+            </a:r>
+            <a:r>
+              <a:rPr lang="en-US" sz="1200" baseline="-25000" dirty="0" smtClean="0"/>
+              <a:t>2</a:t>
+            </a:r>
+            <a:endParaRPr lang="en-US" sz="1200" baseline="-25000" dirty="0"/>
+          </a:p>
+        </p:txBody>
+      </p:sp>
+      <p:sp>
+        <p:nvSpPr>
+          <p:cNvPr id="120" name="TextBox 119"/>
+          <p:cNvSpPr txBox="1"/>
+          <p:nvPr/>
+        </p:nvSpPr>
+        <p:spPr>
+          <a:xfrm>
+            <a:off x="4059485" y="3045297"/>
+            <a:ext cx="372218" cy="276999"/>
+          </a:xfrm>
+          <a:prstGeom prst="rect">
+            <a:avLst/>
+          </a:prstGeom>
+          <a:noFill/>
+        </p:spPr>
+        <p:txBody>
+          <a:bodyPr wrap="none" rtlCol="0">
+            <a:spAutoFit/>
+          </a:bodyPr>
+          <a:lstStyle/>
+          <a:p>
+            <a:r>
+              <a:rPr lang="en-US" sz="1200" dirty="0" smtClean="0"/>
+              <a:t>W</a:t>
+            </a:r>
+            <a:r>
+              <a:rPr lang="en-US" sz="1200" baseline="-25000" dirty="0" smtClean="0"/>
+              <a:t>3</a:t>
+            </a:r>
+            <a:endParaRPr lang="en-US" sz="1200" baseline="-25000" dirty="0"/>
+          </a:p>
+        </p:txBody>
+      </p:sp>
+      <p:cxnSp>
+        <p:nvCxnSpPr>
+          <p:cNvPr id="123" name="Straight Arrow Connector 122"/>
+          <p:cNvCxnSpPr/>
+          <p:nvPr/>
+        </p:nvCxnSpPr>
+        <p:spPr>
+          <a:xfrm>
+            <a:off x="5396475" y="2673106"/>
+            <a:ext cx="385536" cy="6270"/>
+          </a:xfrm>
+          <a:prstGeom prst="straightConnector1">
+            <a:avLst/>
+          </a:prstGeom>
+          <a:ln>
+            <a:solidFill>
+              <a:schemeClr val="tx1"/>
+            </a:solidFill>
+            <a:tailEnd type="arrow"/>
+          </a:ln>
+        </p:spPr>
+        <p:style>
+          <a:lnRef idx="1">
+            <a:schemeClr val="accent1"/>
+          </a:lnRef>
+          <a:fillRef idx="0">
+            <a:schemeClr val="accent1"/>
+          </a:fillRef>
+          <a:effectRef idx="0">
+            <a:schemeClr val="accent1"/>
+          </a:effectRef>
+          <a:fontRef idx="minor">
+            <a:schemeClr val="tx1"/>
+          </a:fontRef>
+        </p:style>
+      </p:cxnSp>
+      <p:sp>
+        <p:nvSpPr>
+          <p:cNvPr id="124" name="Oval 123"/>
+          <p:cNvSpPr/>
+          <p:nvPr/>
+        </p:nvSpPr>
+        <p:spPr>
+          <a:xfrm>
+            <a:off x="5782011" y="2428345"/>
+            <a:ext cx="533400" cy="516523"/>
+          </a:xfrm>
+          <a:prstGeom prst="ellipse">
+            <a:avLst/>
+          </a:prstGeom>
+          <a:solidFill>
+            <a:schemeClr val="bg1"/>
+          </a:solidFill>
+          <a:ln>
+            <a:solidFill>
+              <a:schemeClr val="bg1">
+                <a:lumMod val="50000"/>
+              </a:schemeClr>
+            </a:solidFill>
+          </a:ln>
+        </p:spPr>
+        <p:style>
+          <a:lnRef idx="2">
+            <a:schemeClr val="accent1">
+              <a:shade val="50000"/>
+            </a:schemeClr>
+          </a:lnRef>
+          <a:fillRef idx="1">
+            <a:schemeClr val="accent1"/>
+          </a:fillRef>
+          <a:effectRef idx="0">
+            <a:schemeClr val="accent1"/>
+          </a:effectRef>
+          <a:fontRef idx="minor">
+            <a:schemeClr val="lt1"/>
+          </a:fontRef>
+        </p:style>
+        <p:txBody>
+          <a:bodyPr rtlCol="0" anchor="ctr"/>
+          <a:lstStyle/>
+          <a:p>
+            <a:pPr algn="ctr"/>
+            <a:r>
+              <a:rPr lang="en-US" sz="1600" dirty="0" smtClean="0">
+                <a:solidFill>
+                  <a:schemeClr val="tx1"/>
+                </a:solidFill>
+              </a:rPr>
+              <a:t>∫</a:t>
+            </a:r>
+            <a:endParaRPr lang="en-US" sz="1600" dirty="0">
+              <a:solidFill>
+                <a:schemeClr val="tx1"/>
+              </a:solidFill>
+            </a:endParaRPr>
+          </a:p>
+        </p:txBody>
+      </p:sp>
+      <p:cxnSp>
+        <p:nvCxnSpPr>
+          <p:cNvPr id="127" name="Straight Arrow Connector 126"/>
+          <p:cNvCxnSpPr/>
+          <p:nvPr/>
+        </p:nvCxnSpPr>
+        <p:spPr>
+          <a:xfrm>
+            <a:off x="6346254" y="2673106"/>
+            <a:ext cx="385536" cy="6270"/>
+          </a:xfrm>
+          <a:prstGeom prst="straightConnector1">
+            <a:avLst/>
+          </a:prstGeom>
+          <a:ln>
+            <a:solidFill>
+              <a:schemeClr val="tx1"/>
+            </a:solidFill>
+            <a:tailEnd type="arrow"/>
+          </a:ln>
+        </p:spPr>
+        <p:style>
+          <a:lnRef idx="1">
+            <a:schemeClr val="accent1"/>
+          </a:lnRef>
+          <a:fillRef idx="0">
+            <a:schemeClr val="accent1"/>
+          </a:fillRef>
+          <a:effectRef idx="0">
+            <a:schemeClr val="accent1"/>
+          </a:effectRef>
+          <a:fontRef idx="minor">
+            <a:schemeClr val="tx1"/>
+          </a:fontRef>
+        </p:style>
+      </p:cxnSp>
+      <p:sp>
+        <p:nvSpPr>
+          <p:cNvPr id="129" name="TextBox 128"/>
+          <p:cNvSpPr txBox="1"/>
+          <p:nvPr/>
+        </p:nvSpPr>
+        <p:spPr>
+          <a:xfrm>
+            <a:off x="6760365" y="2522355"/>
+            <a:ext cx="593432" cy="276999"/>
+          </a:xfrm>
+          <a:prstGeom prst="rect">
+            <a:avLst/>
+          </a:prstGeom>
+          <a:noFill/>
+        </p:spPr>
+        <p:txBody>
+          <a:bodyPr wrap="none" rtlCol="0">
+            <a:spAutoFit/>
+          </a:bodyPr>
+          <a:lstStyle/>
+          <a:p>
+            <a:r>
+              <a:rPr lang="en-US" sz="1200" dirty="0" smtClean="0"/>
+              <a:t>-1 or 1</a:t>
+            </a:r>
+            <a:endParaRPr lang="en-US" sz="1200" dirty="0"/>
+          </a:p>
+        </p:txBody>
+      </p:sp>
+      <p:sp>
+        <p:nvSpPr>
+          <p:cNvPr id="130" name="TextBox 129"/>
+          <p:cNvSpPr txBox="1"/>
+          <p:nvPr/>
+        </p:nvSpPr>
+        <p:spPr>
+          <a:xfrm>
+            <a:off x="5527217" y="2089146"/>
+            <a:ext cx="1042208" cy="276999"/>
+          </a:xfrm>
+          <a:prstGeom prst="rect">
+            <a:avLst/>
+          </a:prstGeom>
+          <a:noFill/>
+        </p:spPr>
+        <p:txBody>
+          <a:bodyPr wrap="none" rtlCol="0">
+            <a:spAutoFit/>
+          </a:bodyPr>
+          <a:lstStyle/>
+          <a:p>
+            <a:r>
+              <a:rPr lang="en-US" sz="1200" dirty="0" smtClean="0"/>
+              <a:t>Step Function</a:t>
+            </a:r>
+            <a:endParaRPr lang="en-US" sz="1200" dirty="0"/>
+          </a:p>
+        </p:txBody>
+      </p:sp>
+      <p:sp>
+        <p:nvSpPr>
+          <p:cNvPr id="135" name="Oval 134"/>
+          <p:cNvSpPr/>
+          <p:nvPr/>
+        </p:nvSpPr>
+        <p:spPr>
+          <a:xfrm>
+            <a:off x="3453375" y="4075152"/>
+            <a:ext cx="533400" cy="516523"/>
+          </a:xfrm>
+          <a:prstGeom prst="ellipse">
+            <a:avLst/>
+          </a:prstGeom>
+          <a:solidFill>
+            <a:schemeClr val="bg1"/>
+          </a:solidFill>
+          <a:ln>
+            <a:solidFill>
+              <a:schemeClr val="bg1">
+                <a:lumMod val="50000"/>
+              </a:schemeClr>
+            </a:solidFill>
+          </a:ln>
+        </p:spPr>
+        <p:style>
+          <a:lnRef idx="2">
+            <a:schemeClr val="accent1">
+              <a:shade val="50000"/>
+            </a:schemeClr>
+          </a:lnRef>
+          <a:fillRef idx="1">
+            <a:schemeClr val="accent1"/>
+          </a:fillRef>
+          <a:effectRef idx="0">
+            <a:schemeClr val="accent1"/>
+          </a:effectRef>
+          <a:fontRef idx="minor">
+            <a:schemeClr val="lt1"/>
+          </a:fontRef>
+        </p:style>
+        <p:txBody>
+          <a:bodyPr rtlCol="0" anchor="ctr"/>
+          <a:lstStyle/>
+          <a:p>
+            <a:pPr algn="ctr"/>
+            <a:r>
+              <a:rPr lang="en-US" sz="1600" dirty="0" smtClean="0">
+                <a:solidFill>
+                  <a:schemeClr val="tx1"/>
+                </a:solidFill>
+              </a:rPr>
+              <a:t>X</a:t>
+            </a:r>
+            <a:r>
+              <a:rPr lang="en-US" sz="1600" baseline="-25000" dirty="0" smtClean="0">
+                <a:solidFill>
+                  <a:schemeClr val="tx1"/>
+                </a:solidFill>
+              </a:rPr>
+              <a:t>0</a:t>
+            </a:r>
+            <a:endParaRPr lang="en-US" sz="1600" baseline="-25000" dirty="0">
+              <a:solidFill>
+                <a:schemeClr val="tx1"/>
+              </a:solidFill>
+            </a:endParaRPr>
+          </a:p>
+        </p:txBody>
+      </p:sp>
+      <p:cxnSp>
+        <p:nvCxnSpPr>
+          <p:cNvPr id="136" name="Straight Arrow Connector 135"/>
+          <p:cNvCxnSpPr>
+            <a:endCxn id="72" idx="3"/>
+          </p:cNvCxnSpPr>
+          <p:nvPr/>
+        </p:nvCxnSpPr>
+        <p:spPr>
+          <a:xfrm flipV="1">
+            <a:off x="3909578" y="2861994"/>
+            <a:ext cx="1031612" cy="1312404"/>
+          </a:xfrm>
+          <a:prstGeom prst="straightConnector1">
+            <a:avLst/>
+          </a:prstGeom>
+          <a:ln>
+            <a:solidFill>
+              <a:schemeClr val="tx1"/>
+            </a:solidFill>
+            <a:tailEnd type="arrow"/>
+          </a:ln>
+        </p:spPr>
+        <p:style>
+          <a:lnRef idx="1">
+            <a:schemeClr val="accent1"/>
+          </a:lnRef>
+          <a:fillRef idx="0">
+            <a:schemeClr val="accent1"/>
+          </a:fillRef>
+          <a:effectRef idx="0">
+            <a:schemeClr val="accent1"/>
+          </a:effectRef>
+          <a:fontRef idx="minor">
+            <a:schemeClr val="tx1"/>
+          </a:fontRef>
+        </p:style>
+      </p:cxnSp>
+      <p:sp>
+        <p:nvSpPr>
+          <p:cNvPr id="138" name="TextBox 137"/>
+          <p:cNvSpPr txBox="1"/>
+          <p:nvPr/>
+        </p:nvSpPr>
+        <p:spPr>
+          <a:xfrm>
+            <a:off x="4098800" y="3817173"/>
+            <a:ext cx="372218" cy="276999"/>
+          </a:xfrm>
+          <a:prstGeom prst="rect">
+            <a:avLst/>
+          </a:prstGeom>
+          <a:noFill/>
+        </p:spPr>
+        <p:txBody>
+          <a:bodyPr wrap="none" rtlCol="0">
+            <a:spAutoFit/>
+          </a:bodyPr>
+          <a:lstStyle/>
+          <a:p>
+            <a:r>
+              <a:rPr lang="en-US" sz="1200" dirty="0" smtClean="0"/>
+              <a:t>W</a:t>
+            </a:r>
+            <a:r>
+              <a:rPr lang="en-US" sz="1200" baseline="-25000" dirty="0" smtClean="0"/>
+              <a:t>0</a:t>
+            </a:r>
+            <a:endParaRPr lang="en-US" sz="1200" baseline="-25000" dirty="0"/>
+          </a:p>
+        </p:txBody>
+      </p:sp>
+      <p:sp>
+        <p:nvSpPr>
+          <p:cNvPr id="4" name="Can 3"/>
+          <p:cNvSpPr/>
+          <p:nvPr/>
+        </p:nvSpPr>
+        <p:spPr>
+          <a:xfrm>
+            <a:off x="1485900" y="1720606"/>
+            <a:ext cx="1066800" cy="2055232"/>
+          </a:xfrm>
+          <a:prstGeom prst="can">
+            <a:avLst/>
+          </a:prstGeom>
+        </p:spPr>
+        <p:style>
+          <a:lnRef idx="2">
+            <a:schemeClr val="accent1">
+              <a:shade val="50000"/>
+            </a:schemeClr>
+          </a:lnRef>
+          <a:fillRef idx="1">
+            <a:schemeClr val="accent1"/>
+          </a:fillRef>
+          <a:effectRef idx="0">
+            <a:schemeClr val="accent1"/>
+          </a:effectRef>
+          <a:fontRef idx="minor">
+            <a:schemeClr val="lt1"/>
+          </a:fontRef>
+        </p:style>
+        <p:txBody>
+          <a:bodyPr rtlCol="0" anchor="ctr"/>
+          <a:lstStyle/>
+          <a:p>
+            <a:pPr algn="ctr"/>
+            <a:r>
+              <a:rPr lang="en-US" dirty="0" smtClean="0"/>
+              <a:t>Training</a:t>
+            </a:r>
+          </a:p>
+          <a:p>
+            <a:pPr algn="ctr"/>
+            <a:r>
+              <a:rPr lang="en-US" dirty="0" smtClean="0"/>
+              <a:t>Data</a:t>
+            </a:r>
+            <a:endParaRPr lang="en-US" dirty="0"/>
+          </a:p>
+        </p:txBody>
+      </p:sp>
+      <p:sp>
+        <p:nvSpPr>
+          <p:cNvPr id="8" name="Striped Right Arrow 7"/>
+          <p:cNvSpPr/>
+          <p:nvPr/>
+        </p:nvSpPr>
+        <p:spPr>
+          <a:xfrm>
+            <a:off x="2705100" y="1829357"/>
+            <a:ext cx="609600" cy="1828799"/>
+          </a:xfrm>
+          <a:prstGeom prst="stripedRightArrow">
+            <a:avLst/>
+          </a:prstGeom>
+          <a:solidFill>
+            <a:schemeClr val="bg1">
+              <a:lumMod val="65000"/>
+            </a:schemeClr>
+          </a:solidFill>
+          <a:ln>
+            <a:solidFill>
+              <a:schemeClr val="bg1">
+                <a:lumMod val="65000"/>
+              </a:schemeClr>
+            </a:solidFill>
+          </a:ln>
+        </p:spPr>
+        <p:style>
+          <a:lnRef idx="2">
+            <a:schemeClr val="accent1">
+              <a:shade val="50000"/>
+            </a:schemeClr>
+          </a:lnRef>
+          <a:fillRef idx="1">
+            <a:schemeClr val="accent1"/>
+          </a:fillRef>
+          <a:effectRef idx="0">
+            <a:schemeClr val="accent1"/>
+          </a:effectRef>
+          <a:fontRef idx="minor">
+            <a:schemeClr val="lt1"/>
+          </a:fontRef>
+        </p:style>
+        <p:txBody>
+          <a:bodyPr rtlCol="0" anchor="ctr"/>
+          <a:lstStyle/>
+          <a:p>
+            <a:pPr algn="ctr"/>
+            <a:endParaRPr lang="en-US"/>
+          </a:p>
+        </p:txBody>
+      </p:sp>
+      <p:cxnSp>
+        <p:nvCxnSpPr>
+          <p:cNvPr id="10" name="Straight Arrow Connector 9"/>
+          <p:cNvCxnSpPr/>
+          <p:nvPr/>
+        </p:nvCxnSpPr>
+        <p:spPr>
+          <a:xfrm>
+            <a:off x="6048321" y="3045297"/>
+            <a:ext cx="9578" cy="967853"/>
+          </a:xfrm>
+          <a:prstGeom prst="straightConnector1">
+            <a:avLst/>
+          </a:prstGeom>
+          <a:ln>
+            <a:solidFill>
+              <a:schemeClr val="bg1">
+                <a:lumMod val="65000"/>
+              </a:schemeClr>
+            </a:solidFill>
+            <a:tailEnd type="arrow"/>
+          </a:ln>
+        </p:spPr>
+        <p:style>
+          <a:lnRef idx="1">
+            <a:schemeClr val="accent1"/>
+          </a:lnRef>
+          <a:fillRef idx="0">
+            <a:schemeClr val="accent1"/>
+          </a:fillRef>
+          <a:effectRef idx="0">
+            <a:schemeClr val="accent1"/>
+          </a:effectRef>
+          <a:fontRef idx="minor">
+            <a:schemeClr val="tx1"/>
+          </a:fontRef>
+        </p:style>
+      </p:cxnSp>
+      <p:sp>
+        <p:nvSpPr>
+          <p:cNvPr id="11" name="Rounded Rectangle 10"/>
+          <p:cNvSpPr/>
+          <p:nvPr/>
+        </p:nvSpPr>
+        <p:spPr>
+          <a:xfrm>
+            <a:off x="5210119" y="4086538"/>
+            <a:ext cx="1676401" cy="457200"/>
+          </a:xfrm>
+          <a:prstGeom prst="roundRect">
+            <a:avLst/>
+          </a:prstGeom>
+          <a:solidFill>
+            <a:srgbClr val="0070C0"/>
+          </a:solidFill>
+          <a:ln>
+            <a:solidFill>
+              <a:srgbClr val="0070C0"/>
+            </a:solidFill>
+          </a:ln>
+        </p:spPr>
+        <p:style>
+          <a:lnRef idx="2">
+            <a:schemeClr val="accent1">
+              <a:shade val="50000"/>
+            </a:schemeClr>
+          </a:lnRef>
+          <a:fillRef idx="1">
+            <a:schemeClr val="accent1"/>
+          </a:fillRef>
+          <a:effectRef idx="0">
+            <a:schemeClr val="accent1"/>
+          </a:effectRef>
+          <a:fontRef idx="minor">
+            <a:schemeClr val="lt1"/>
+          </a:fontRef>
+        </p:style>
+        <p:txBody>
+          <a:bodyPr rtlCol="0" anchor="ctr"/>
+          <a:lstStyle/>
+          <a:p>
+            <a:pPr algn="ctr"/>
+            <a:r>
+              <a:rPr lang="en-US" dirty="0" smtClean="0"/>
+              <a:t>Adjust Weights</a:t>
+            </a:r>
+            <a:endParaRPr lang="en-US" dirty="0"/>
+          </a:p>
+        </p:txBody>
+      </p:sp>
+      <p:sp>
+        <p:nvSpPr>
+          <p:cNvPr id="38" name="Striped Right Arrow 37"/>
+          <p:cNvSpPr/>
+          <p:nvPr/>
+        </p:nvSpPr>
+        <p:spPr>
+          <a:xfrm rot="12986976">
+            <a:off x="4636391" y="2958132"/>
+            <a:ext cx="609600" cy="1828799"/>
+          </a:xfrm>
+          <a:prstGeom prst="stripedRightArrow">
+            <a:avLst/>
+          </a:prstGeom>
+          <a:solidFill>
+            <a:schemeClr val="bg1">
+              <a:lumMod val="65000"/>
+            </a:schemeClr>
+          </a:solidFill>
+          <a:ln>
+            <a:solidFill>
+              <a:schemeClr val="bg1">
+                <a:lumMod val="65000"/>
+              </a:schemeClr>
+            </a:solidFill>
+          </a:ln>
+        </p:spPr>
+        <p:style>
+          <a:lnRef idx="2">
+            <a:schemeClr val="accent1">
+              <a:shade val="50000"/>
+            </a:schemeClr>
+          </a:lnRef>
+          <a:fillRef idx="1">
+            <a:schemeClr val="accent1"/>
+          </a:fillRef>
+          <a:effectRef idx="0">
+            <a:schemeClr val="accent1"/>
+          </a:effectRef>
+          <a:fontRef idx="minor">
+            <a:schemeClr val="lt1"/>
+          </a:fontRef>
+        </p:style>
+        <p:txBody>
+          <a:bodyPr rtlCol="0" anchor="ctr"/>
+          <a:lstStyle/>
+          <a:p>
+            <a:pPr algn="ctr"/>
+            <a:endParaRPr lang="en-US"/>
+          </a:p>
+        </p:txBody>
+      </p:sp>
+      <p:sp>
+        <p:nvSpPr>
+          <p:cNvPr id="17" name="TextBox 16"/>
+          <p:cNvSpPr txBox="1"/>
+          <p:nvPr/>
+        </p:nvSpPr>
+        <p:spPr>
+          <a:xfrm>
+            <a:off x="361769" y="4864786"/>
+            <a:ext cx="6572431" cy="1754326"/>
+          </a:xfrm>
+          <a:prstGeom prst="rect">
+            <a:avLst/>
+          </a:prstGeom>
+          <a:noFill/>
+        </p:spPr>
+        <p:txBody>
+          <a:bodyPr wrap="square" rtlCol="0">
+            <a:spAutoFit/>
+          </a:bodyPr>
+          <a:lstStyle/>
+          <a:p>
+            <a:r>
+              <a:rPr lang="en-US" b="1" dirty="0" smtClean="0"/>
+              <a:t>function Perceptron( data )</a:t>
+            </a:r>
+          </a:p>
+          <a:p>
+            <a:r>
+              <a:rPr lang="en-US" b="1" dirty="0"/>
+              <a:t>	</a:t>
+            </a:r>
+            <a:r>
+              <a:rPr lang="en-US" b="1" dirty="0" smtClean="0"/>
+              <a:t>initialize </a:t>
+            </a:r>
+            <a:r>
+              <a:rPr lang="en-US" b="1" dirty="0" smtClean="0">
+                <a:solidFill>
+                  <a:schemeClr val="accent6">
+                    <a:lumMod val="75000"/>
+                  </a:schemeClr>
+                </a:solidFill>
+              </a:rPr>
+              <a:t>weights</a:t>
+            </a:r>
+            <a:r>
+              <a:rPr lang="en-US" b="1" dirty="0" smtClean="0"/>
+              <a:t> to zero</a:t>
+            </a:r>
+          </a:p>
+          <a:p>
+            <a:r>
+              <a:rPr lang="en-US" b="1" dirty="0"/>
+              <a:t>	</a:t>
+            </a:r>
+            <a:r>
+              <a:rPr lang="en-US" b="1" dirty="0" smtClean="0"/>
+              <a:t>repeat until </a:t>
+            </a:r>
+            <a:r>
+              <a:rPr lang="en-US" b="1" u="sng" dirty="0" smtClean="0"/>
+              <a:t>convergence</a:t>
+            </a:r>
+          </a:p>
+          <a:p>
+            <a:r>
+              <a:rPr lang="en-US" b="1" dirty="0"/>
+              <a:t>	</a:t>
+            </a:r>
+            <a:r>
+              <a:rPr lang="en-US" b="1" dirty="0" smtClean="0"/>
+              <a:t>	for each sample in data</a:t>
+            </a:r>
+          </a:p>
+          <a:p>
+            <a:r>
+              <a:rPr lang="en-US" b="1" dirty="0"/>
+              <a:t>	</a:t>
+            </a:r>
+            <a:r>
+              <a:rPr lang="en-US" b="1" dirty="0" smtClean="0"/>
+              <a:t>		if </a:t>
+            </a:r>
+            <a:r>
+              <a:rPr lang="en-US" b="1" dirty="0" err="1" smtClean="0"/>
+              <a:t>y</a:t>
+            </a:r>
+            <a:r>
+              <a:rPr lang="en-US" b="1" baseline="-25000" dirty="0" err="1" smtClean="0"/>
+              <a:t>i</a:t>
+            </a:r>
+            <a:r>
+              <a:rPr lang="en-US" b="1" dirty="0" smtClean="0"/>
+              <a:t> not equal to f(x</a:t>
+            </a:r>
+            <a:r>
+              <a:rPr lang="en-US" b="1" baseline="-25000" dirty="0" smtClean="0"/>
+              <a:t>i</a:t>
+            </a:r>
+            <a:r>
+              <a:rPr lang="en-US" b="1" dirty="0" smtClean="0"/>
+              <a:t>)</a:t>
+            </a:r>
+          </a:p>
+          <a:p>
+            <a:r>
+              <a:rPr lang="en-US" b="1" dirty="0"/>
+              <a:t>	</a:t>
+            </a:r>
+            <a:r>
+              <a:rPr lang="en-US" b="1" dirty="0" smtClean="0"/>
+              <a:t>			add </a:t>
+            </a:r>
+            <a:r>
+              <a:rPr lang="en-US" b="1" dirty="0" smtClean="0"/>
+              <a:t>( </a:t>
+            </a:r>
+            <a:r>
+              <a:rPr lang="en-US" b="1" dirty="0" err="1" smtClean="0"/>
+              <a:t>y</a:t>
+            </a:r>
+            <a:r>
+              <a:rPr lang="en-US" b="1" baseline="-25000" dirty="0" err="1" smtClean="0"/>
+              <a:t>i</a:t>
+            </a:r>
+            <a:r>
+              <a:rPr lang="en-US" b="1" dirty="0" smtClean="0"/>
+              <a:t> * x</a:t>
+            </a:r>
+            <a:r>
+              <a:rPr lang="en-US" b="1" baseline="-25000" dirty="0" smtClean="0"/>
+              <a:t>i </a:t>
+            </a:r>
+            <a:r>
+              <a:rPr lang="en-US" b="1" dirty="0"/>
+              <a:t>) to all </a:t>
+            </a:r>
+            <a:r>
+              <a:rPr lang="en-US" b="1" dirty="0">
+                <a:solidFill>
+                  <a:schemeClr val="accent6">
+                    <a:lumMod val="75000"/>
+                  </a:schemeClr>
+                </a:solidFill>
+              </a:rPr>
+              <a:t>weights</a:t>
+            </a:r>
+            <a:r>
+              <a:rPr lang="en-US" b="1" baseline="-25000" dirty="0" smtClean="0"/>
+              <a:t> </a:t>
+            </a:r>
+            <a:r>
+              <a:rPr lang="en-US" b="1" dirty="0" smtClean="0"/>
+              <a:t> </a:t>
+            </a:r>
+            <a:endParaRPr lang="en-US" b="1" dirty="0"/>
+          </a:p>
+        </p:txBody>
+      </p:sp>
+      <p:sp>
+        <p:nvSpPr>
+          <p:cNvPr id="19" name="Left Arrow 18"/>
+          <p:cNvSpPr/>
+          <p:nvPr/>
+        </p:nvSpPr>
+        <p:spPr>
+          <a:xfrm>
+            <a:off x="4677111" y="5846206"/>
+            <a:ext cx="457200" cy="76200"/>
+          </a:xfrm>
+          <a:prstGeom prst="leftArrow">
+            <a:avLst/>
+          </a:prstGeom>
+          <a:solidFill>
+            <a:srgbClr val="FF0000"/>
+          </a:solidFill>
+          <a:ln>
+            <a:solidFill>
+              <a:srgbClr val="FF0000"/>
+            </a:solidFill>
+          </a:ln>
+        </p:spPr>
+        <p:style>
+          <a:lnRef idx="2">
+            <a:schemeClr val="accent1">
+              <a:shade val="50000"/>
+            </a:schemeClr>
+          </a:lnRef>
+          <a:fillRef idx="1">
+            <a:schemeClr val="accent1"/>
+          </a:fillRef>
+          <a:effectRef idx="0">
+            <a:schemeClr val="accent1"/>
+          </a:effectRef>
+          <a:fontRef idx="minor">
+            <a:schemeClr val="lt1"/>
+          </a:fontRef>
+        </p:style>
+        <p:txBody>
+          <a:bodyPr rtlCol="0" anchor="ctr"/>
+          <a:lstStyle/>
+          <a:p>
+            <a:pPr algn="ctr"/>
+            <a:endParaRPr lang="en-US"/>
+          </a:p>
+        </p:txBody>
+      </p:sp>
+      <p:sp>
+        <p:nvSpPr>
+          <p:cNvPr id="20" name="TextBox 19"/>
+          <p:cNvSpPr txBox="1"/>
+          <p:nvPr/>
+        </p:nvSpPr>
+        <p:spPr>
+          <a:xfrm>
+            <a:off x="5399485" y="5584596"/>
+            <a:ext cx="2961645" cy="523220"/>
+          </a:xfrm>
+          <a:prstGeom prst="rect">
+            <a:avLst/>
+          </a:prstGeom>
+          <a:noFill/>
+        </p:spPr>
+        <p:txBody>
+          <a:bodyPr wrap="none" rtlCol="0">
+            <a:spAutoFit/>
+          </a:bodyPr>
+          <a:lstStyle/>
+          <a:p>
+            <a:r>
+              <a:rPr lang="en-US" sz="1400" dirty="0" smtClean="0">
+                <a:solidFill>
+                  <a:srgbClr val="FF0000"/>
+                </a:solidFill>
+              </a:rPr>
+              <a:t>Rerun the training data each time the </a:t>
+            </a:r>
+            <a:br>
+              <a:rPr lang="en-US" sz="1400" dirty="0" smtClean="0">
+                <a:solidFill>
+                  <a:srgbClr val="FF0000"/>
+                </a:solidFill>
+              </a:rPr>
+            </a:br>
+            <a:r>
+              <a:rPr lang="en-US" sz="1400" dirty="0" smtClean="0">
+                <a:solidFill>
+                  <a:srgbClr val="FF0000"/>
+                </a:solidFill>
+              </a:rPr>
+              <a:t>weights are updated.</a:t>
+            </a:r>
+            <a:endParaRPr lang="en-US" sz="1400" dirty="0">
+              <a:solidFill>
+                <a:srgbClr val="FF0000"/>
+              </a:solidFill>
+            </a:endParaRPr>
+          </a:p>
+        </p:txBody>
+      </p:sp>
+      <p:sp>
+        <p:nvSpPr>
+          <p:cNvPr id="45" name="Left Arrow 44"/>
+          <p:cNvSpPr/>
+          <p:nvPr/>
+        </p:nvSpPr>
+        <p:spPr>
+          <a:xfrm rot="10800000">
+            <a:off x="3109478" y="6400800"/>
+            <a:ext cx="457200" cy="76200"/>
+          </a:xfrm>
+          <a:prstGeom prst="leftArrow">
+            <a:avLst/>
+          </a:prstGeom>
+          <a:solidFill>
+            <a:srgbClr val="FF0000"/>
+          </a:solidFill>
+          <a:ln>
+            <a:solidFill>
+              <a:srgbClr val="FF0000"/>
+            </a:solidFill>
+          </a:ln>
+        </p:spPr>
+        <p:style>
+          <a:lnRef idx="2">
+            <a:schemeClr val="accent1">
+              <a:shade val="50000"/>
+            </a:schemeClr>
+          </a:lnRef>
+          <a:fillRef idx="1">
+            <a:schemeClr val="accent1"/>
+          </a:fillRef>
+          <a:effectRef idx="0">
+            <a:schemeClr val="accent1"/>
+          </a:effectRef>
+          <a:fontRef idx="minor">
+            <a:schemeClr val="lt1"/>
+          </a:fontRef>
+        </p:style>
+        <p:txBody>
+          <a:bodyPr rtlCol="0" anchor="ctr"/>
+          <a:lstStyle/>
+          <a:p>
+            <a:pPr algn="ctr"/>
+            <a:endParaRPr lang="en-US"/>
+          </a:p>
+        </p:txBody>
+      </p:sp>
+      <p:sp>
+        <p:nvSpPr>
+          <p:cNvPr id="46" name="TextBox 45"/>
+          <p:cNvSpPr txBox="1"/>
+          <p:nvPr/>
+        </p:nvSpPr>
+        <p:spPr>
+          <a:xfrm>
+            <a:off x="958846" y="6293078"/>
+            <a:ext cx="1995739" cy="307777"/>
+          </a:xfrm>
+          <a:prstGeom prst="rect">
+            <a:avLst/>
+          </a:prstGeom>
+          <a:noFill/>
+        </p:spPr>
+        <p:txBody>
+          <a:bodyPr wrap="none" rtlCol="0">
+            <a:spAutoFit/>
+          </a:bodyPr>
+          <a:lstStyle/>
+          <a:p>
+            <a:r>
+              <a:rPr lang="en-US" sz="1400" dirty="0" smtClean="0">
+                <a:solidFill>
+                  <a:srgbClr val="FF0000"/>
+                </a:solidFill>
+              </a:rPr>
+              <a:t>Will be negative if </a:t>
+            </a:r>
+            <a:r>
+              <a:rPr lang="en-US" sz="1400" dirty="0" err="1" smtClean="0">
+                <a:solidFill>
+                  <a:srgbClr val="FF0000"/>
+                </a:solidFill>
+              </a:rPr>
+              <a:t>y</a:t>
+            </a:r>
+            <a:r>
+              <a:rPr lang="en-US" sz="1400" baseline="-25000" dirty="0" err="1" smtClean="0">
+                <a:solidFill>
+                  <a:srgbClr val="FF0000"/>
+                </a:solidFill>
+              </a:rPr>
+              <a:t>i</a:t>
+            </a:r>
+            <a:r>
+              <a:rPr lang="en-US" sz="1400" dirty="0" smtClean="0">
+                <a:solidFill>
+                  <a:srgbClr val="FF0000"/>
+                </a:solidFill>
+              </a:rPr>
+              <a:t> is -1</a:t>
+            </a:r>
+            <a:endParaRPr lang="en-US" sz="1400" dirty="0">
+              <a:solidFill>
+                <a:srgbClr val="FF0000"/>
+              </a:solidFill>
+            </a:endParaRPr>
+          </a:p>
+        </p:txBody>
+      </p:sp>
+      <p:sp>
+        <p:nvSpPr>
+          <p:cNvPr id="34" name="TextBox 33"/>
+          <p:cNvSpPr txBox="1"/>
+          <p:nvPr/>
+        </p:nvSpPr>
+        <p:spPr>
+          <a:xfrm>
+            <a:off x="7227267" y="6157446"/>
+            <a:ext cx="1850058" cy="461665"/>
+          </a:xfrm>
+          <a:prstGeom prst="rect">
+            <a:avLst/>
+          </a:prstGeom>
+          <a:noFill/>
+        </p:spPr>
+        <p:txBody>
+          <a:bodyPr wrap="none" rtlCol="0">
+            <a:spAutoFit/>
+          </a:bodyPr>
+          <a:lstStyle/>
+          <a:p>
+            <a:r>
+              <a:rPr lang="en-US" sz="1200" dirty="0" smtClean="0">
+                <a:solidFill>
+                  <a:srgbClr val="FF0000"/>
+                </a:solidFill>
+              </a:rPr>
+              <a:t>Other variants may add or </a:t>
+            </a:r>
+            <a:br>
+              <a:rPr lang="en-US" sz="1200" dirty="0" smtClean="0">
+                <a:solidFill>
+                  <a:srgbClr val="FF0000"/>
+                </a:solidFill>
+              </a:rPr>
+            </a:br>
+            <a:r>
+              <a:rPr lang="en-US" sz="1200" dirty="0" smtClean="0">
+                <a:solidFill>
+                  <a:srgbClr val="FF0000"/>
+                </a:solidFill>
+              </a:rPr>
+              <a:t>subtract 1 </a:t>
+            </a:r>
+            <a:r>
+              <a:rPr lang="en-US" sz="1200" dirty="0" smtClean="0">
+                <a:solidFill>
+                  <a:srgbClr val="FF0000"/>
+                </a:solidFill>
+              </a:rPr>
+              <a:t>to the weights.</a:t>
+            </a:r>
+            <a:endParaRPr lang="en-US" sz="1200" dirty="0">
+              <a:solidFill>
+                <a:srgbClr val="FF0000"/>
+              </a:solidFill>
+            </a:endParaRPr>
+          </a:p>
+        </p:txBody>
+      </p:sp>
+      <p:sp>
+        <p:nvSpPr>
+          <p:cNvPr id="44" name="Left Arrow 43"/>
+          <p:cNvSpPr/>
+          <p:nvPr/>
+        </p:nvSpPr>
+        <p:spPr>
+          <a:xfrm>
+            <a:off x="6705600" y="6388278"/>
+            <a:ext cx="457200" cy="76200"/>
+          </a:xfrm>
+          <a:prstGeom prst="leftArrow">
+            <a:avLst/>
+          </a:prstGeom>
+          <a:solidFill>
+            <a:srgbClr val="FF0000"/>
+          </a:solidFill>
+          <a:ln>
+            <a:solidFill>
+              <a:srgbClr val="FF0000"/>
+            </a:solidFill>
+          </a:ln>
+        </p:spPr>
+        <p:style>
+          <a:lnRef idx="2">
+            <a:schemeClr val="accent1">
+              <a:shade val="50000"/>
+            </a:schemeClr>
+          </a:lnRef>
+          <a:fillRef idx="1">
+            <a:schemeClr val="accent1"/>
+          </a:fillRef>
+          <a:effectRef idx="0">
+            <a:schemeClr val="accent1"/>
+          </a:effectRef>
+          <a:fontRef idx="minor">
+            <a:schemeClr val="lt1"/>
+          </a:fontRef>
+        </p:style>
+        <p:txBody>
+          <a:bodyPr rtlCol="0" anchor="ctr"/>
+          <a:lstStyle/>
+          <a:p>
+            <a:pPr algn="ctr"/>
+            <a:endParaRPr lang="en-US"/>
+          </a:p>
+        </p:txBody>
+      </p:sp>
+    </p:spTree>
+    <p:extLst>
+      <p:ext uri="{BB962C8B-B14F-4D97-AF65-F5344CB8AC3E}">
+        <p14:creationId xmlns:p14="http://schemas.microsoft.com/office/powerpoint/2010/main" val="1242494599"/>
+      </p:ext>
+    </p:extLst>
+  </p:cSld>
+  <p:clrMapOvr>
+    <a:masterClrMapping/>
+  </p:clrMapOvr>
+  <p:timing>
+    <p:tnLst>
+      <p:par>
+        <p:cTn id="1" dur="indefinite" restart="never" nodeType="tmRoot"/>
+      </p:par>
+    </p:tnLst>
+  </p:timing>
+</p:sld>
+</file>
+
+<file path=ppt/slides/slide8.xml><?xml version="1.0" encoding="utf-8"?>
 <p:sld xmlns:a="http://schemas.openxmlformats.org/drawingml/2006/main" xmlns:r="http://schemas.openxmlformats.org/officeDocument/2006/relationships" xmlns:p="http://schemas.openxmlformats.org/presentationml/2006/main">
   <p:cSld>
     <p:spTree>

</xml_diff>